<commit_message>
feat: git bash seminar 과제
</commit_message>
<xml_diff>
--- a/SOLUX - 깃 기초 과제.pptx
+++ b/SOLUX - 깃 기초 과제.pptx
@@ -1,11 +1,11 @@
 
 <file path=ppt/presentation.xml><?xml version="1.0" encoding="utf-8"?>
-<p:presentation xmlns:a="http://schemas.openxmlformats.org/drawingml/2006/main" xmlns:r="http://schemas.openxmlformats.org/officeDocument/2006/relationships" xmlns:p="http://schemas.openxmlformats.org/presentationml/2006/main" saveSubsetFonts="1">
+<p:presentation xmlns:r="http://schemas.openxmlformats.org/officeDocument/2006/relationships" xmlns:c="http://schemas.openxmlformats.org/drawingml/2006/chart" xmlns:a="http://schemas.openxmlformats.org/drawingml/2006/main" xmlns:dgm="http://schemas.openxmlformats.org/drawingml/2006/diagram" xmlns:dsp="http://schemas.microsoft.com/office/drawing/2008/diagram" xmlns:p="http://schemas.openxmlformats.org/presentationml/2006/main">
   <p:sldMasterIdLst>
-    <p:sldMasterId id="2147483699" r:id="rId4"/>
+    <p:sldMasterId id="2147483699" r:id="rId1"/>
   </p:sldMasterIdLst>
   <p:sldIdLst>
-    <p:sldId id="256" r:id="rId5"/>
+    <p:sldId id="256" r:id="rId2"/>
   </p:sldIdLst>
   <p:sldSz cx="12192000" cy="6858000"/>
   <p:notesSz cx="6858000" cy="9144000"/>
@@ -104,11 +104,6 @@
       </a:defRPr>
     </a:lvl9pPr>
   </p:defaultTextStyle>
-  <p:extLst>
-    <p:ext uri="{EFAFB233-063F-42B5-8137-9DF3F51BA10A}">
-      <p15:sldGuideLst xmlns:p15="http://schemas.microsoft.com/office/powerpoint/2012/main"/>
-    </p:ext>
-  </p:extLst>
 </p:presentation>
 </file>
 
@@ -3403,14 +3398,13 @@
 </file>
 
 <file path=ppt/slides/slide1.xml><?xml version="1.0" encoding="utf-8"?>
-<p:sld xmlns:a="http://schemas.openxmlformats.org/drawingml/2006/main" xmlns:r="http://schemas.openxmlformats.org/officeDocument/2006/relationships" xmlns:p="http://schemas.openxmlformats.org/presentationml/2006/main">
+<p:sld xmlns:r="http://schemas.openxmlformats.org/officeDocument/2006/relationships" xmlns:c="http://schemas.openxmlformats.org/drawingml/2006/chart" xmlns:a="http://schemas.openxmlformats.org/drawingml/2006/main" xmlns:dgm="http://schemas.openxmlformats.org/drawingml/2006/diagram" xmlns:dsp="http://schemas.microsoft.com/office/drawing/2008/diagram" xmlns:p="http://schemas.openxmlformats.org/presentationml/2006/main">
   <p:cSld>
     <p:bg>
-      <p:bgPr>
+      <p:bgPr shadeToTitle="0">
         <a:solidFill>
           <a:schemeClr val="bg1"/>
         </a:solidFill>
-        <a:effectLst/>
       </p:bgPr>
     </p:bg>
     <p:spTree>
@@ -3615,18 +3609,12 @@
       </p:sp>
       <p:sp>
         <p:nvSpPr>
-          <p:cNvPr id="2" name="제목 1">
-            <a:extLst>
-              <a:ext uri="{FF2B5EF4-FFF2-40B4-BE49-F238E27FC236}">
-                <a16:creationId xmlns:a16="http://schemas.microsoft.com/office/drawing/2014/main" id="{C09577F7-6D0E-8A62-DD07-06A7629F5F4B}"/>
-              </a:ext>
-            </a:extLst>
-          </p:cNvPr>
-          <p:cNvSpPr>
-            <a:spLocks noGrp="1"/>
-          </p:cNvSpPr>
-          <p:nvPr>
-            <p:ph type="ctrTitle"/>
+          <p:cNvPr id="2" name="제목 1"/>
+          <p:cNvSpPr>
+            <a:spLocks noGrp="1"/>
+          </p:cNvSpPr>
+          <p:nvPr>
+            <p:ph type="ctrTitle" idx="0"/>
           </p:nvPr>
         </p:nvSpPr>
         <p:spPr>
@@ -3641,139 +3629,136 @@
           </a:bodyPr>
           <a:lstStyle/>
           <a:p>
-            <a:r>
-              <a:rPr lang="en-US" altLang="ko-KR" b="1" dirty="0">
+            <a:pPr lvl="0">
+              <a:defRPr/>
+            </a:pPr>
+            <a:r>
+              <a:rPr lang="en-US" altLang="ko-KR" b="1">
                 <a:solidFill>
-                  <a:srgbClr val="FFFFFF"/>
+                  <a:srgbClr val="ffffff"/>
                 </a:solidFill>
-                <a:latin typeface="한컴 말랑말랑 Bold" panose="020F0803000000000000" pitchFamily="50" charset="-127"/>
-                <a:ea typeface="한컴 말랑말랑 Bold" panose="020F0803000000000000" pitchFamily="50" charset="-127"/>
+                <a:latin typeface="한컴 말랑말랑 Bold"/>
+                <a:ea typeface="한컴 말랑말랑 Bold"/>
               </a:rPr>
               <a:t>!SOLUX - </a:t>
             </a:r>
             <a:r>
-              <a:rPr lang="ko-KR" altLang="en-US" b="1" dirty="0">
+              <a:rPr lang="ko-KR" altLang="en-US" b="1">
                 <a:solidFill>
-                  <a:srgbClr val="FFFFFF"/>
+                  <a:srgbClr val="ffffff"/>
                 </a:solidFill>
-                <a:latin typeface="한컴 말랑말랑 Bold" panose="020F0803000000000000" pitchFamily="50" charset="-127"/>
-                <a:ea typeface="한컴 말랑말랑 Bold" panose="020F0803000000000000" pitchFamily="50" charset="-127"/>
+                <a:latin typeface="한컴 말랑말랑 Bold"/>
+                <a:ea typeface="한컴 말랑말랑 Bold"/>
               </a:rPr>
               <a:t>깃 기초 세미나 완료</a:t>
             </a:r>
             <a:r>
-              <a:rPr lang="en-US" altLang="ko-KR" b="1" dirty="0">
+              <a:rPr lang="en-US" altLang="ko-KR" b="1">
                 <a:solidFill>
-                  <a:srgbClr val="FFFFFF"/>
+                  <a:srgbClr val="ffffff"/>
                 </a:solidFill>
-                <a:latin typeface="한컴 말랑말랑 Bold" panose="020F0803000000000000" pitchFamily="50" charset="-127"/>
-                <a:ea typeface="한컴 말랑말랑 Bold" panose="020F0803000000000000" pitchFamily="50" charset="-127"/>
+                <a:latin typeface="한컴 말랑말랑 Bold"/>
+                <a:ea typeface="한컴 말랑말랑 Bold"/>
               </a:rPr>
               <a:t>!</a:t>
             </a:r>
             <a:br>
-              <a:rPr lang="en-US" altLang="ko-KR" dirty="0">
+              <a:rPr lang="en-US" altLang="ko-KR">
                 <a:solidFill>
-                  <a:srgbClr val="FFFFFF"/>
+                  <a:srgbClr val="ffffff"/>
                 </a:solidFill>
-                <a:latin typeface="한컴 말랑말랑 Bold" panose="020F0803000000000000" pitchFamily="50" charset="-127"/>
-                <a:ea typeface="한컴 말랑말랑 Bold" panose="020F0803000000000000" pitchFamily="50" charset="-127"/>
+                <a:latin typeface="한컴 말랑말랑 Bold"/>
+                <a:ea typeface="한컴 말랑말랑 Bold"/>
               </a:rPr>
             </a:br>
             <a:br>
-              <a:rPr lang="en-US" altLang="ko-KR" dirty="0">
+              <a:rPr lang="en-US" altLang="ko-KR">
                 <a:solidFill>
-                  <a:srgbClr val="FFFFFF"/>
+                  <a:srgbClr val="ffffff"/>
                 </a:solidFill>
-                <a:latin typeface="한컴 말랑말랑 Bold" panose="020F0803000000000000" pitchFamily="50" charset="-127"/>
-                <a:ea typeface="한컴 말랑말랑 Bold" panose="020F0803000000000000" pitchFamily="50" charset="-127"/>
+                <a:latin typeface="한컴 말랑말랑 Bold"/>
+                <a:ea typeface="한컴 말랑말랑 Bold"/>
               </a:rPr>
             </a:br>
             <a:r>
-              <a:rPr lang="ko-KR" altLang="en-US" dirty="0">
+              <a:rPr lang="ko-KR" altLang="en-US">
                 <a:solidFill>
-                  <a:srgbClr val="FFFFFF"/>
+                  <a:srgbClr val="ffffff"/>
                 </a:solidFill>
-                <a:latin typeface="한컴 말랑말랑 Bold" panose="020F0803000000000000" pitchFamily="50" charset="-127"/>
-                <a:ea typeface="한컴 말랑말랑 Bold" panose="020F0803000000000000" pitchFamily="50" charset="-127"/>
+                <a:latin typeface="한컴 말랑말랑 Bold"/>
+                <a:ea typeface="한컴 말랑말랑 Bold"/>
               </a:rPr>
               <a:t>깃 명령어 중 기억에 남는 것 두개를 적어주세요</a:t>
             </a:r>
             <a:br>
-              <a:rPr lang="en-US" altLang="ko-KR" dirty="0">
+              <a:rPr lang="en-US" altLang="ko-KR">
                 <a:solidFill>
-                  <a:srgbClr val="FFFFFF"/>
+                  <a:srgbClr val="ffffff"/>
                 </a:solidFill>
-                <a:latin typeface="한컴 말랑말랑 Bold" panose="020F0803000000000000" pitchFamily="50" charset="-127"/>
-                <a:ea typeface="한컴 말랑말랑 Bold" panose="020F0803000000000000" pitchFamily="50" charset="-127"/>
+                <a:latin typeface="한컴 말랑말랑 Bold"/>
+                <a:ea typeface="한컴 말랑말랑 Bold"/>
               </a:rPr>
             </a:br>
             <a:br>
-              <a:rPr lang="en-US" altLang="ko-KR" dirty="0">
+              <a:rPr lang="en-US" altLang="ko-KR">
                 <a:solidFill>
-                  <a:srgbClr val="FFFFFF"/>
+                  <a:srgbClr val="ffffff"/>
                 </a:solidFill>
-                <a:latin typeface="한컴 말랑말랑 Bold" panose="020F0803000000000000" pitchFamily="50" charset="-127"/>
-                <a:ea typeface="한컴 말랑말랑 Bold" panose="020F0803000000000000" pitchFamily="50" charset="-127"/>
+                <a:latin typeface="한컴 말랑말랑 Bold"/>
+                <a:ea typeface="한컴 말랑말랑 Bold"/>
               </a:rPr>
             </a:br>
             <a:r>
-              <a:rPr lang="en-US" altLang="ko-KR" dirty="0">
+              <a:rPr lang="en-US" altLang="ko-KR">
                 <a:solidFill>
-                  <a:srgbClr val="FFFFFF"/>
+                  <a:srgbClr val="ffffff"/>
                 </a:solidFill>
-                <a:latin typeface="한컴 말랑말랑 Bold" panose="020F0803000000000000" pitchFamily="50" charset="-127"/>
-                <a:ea typeface="한컴 말랑말랑 Bold" panose="020F0803000000000000" pitchFamily="50" charset="-127"/>
+                <a:latin typeface="한컴 말랑말랑 Bold"/>
+                <a:ea typeface="한컴 말랑말랑 Bold"/>
               </a:rPr>
-              <a:t>1. --------</a:t>
+              <a:t>1. git add</a:t>
             </a:r>
             <a:br>
-              <a:rPr lang="en-US" altLang="ko-KR" dirty="0">
+              <a:rPr lang="en-US" altLang="ko-KR">
                 <a:solidFill>
-                  <a:srgbClr val="FFFFFF"/>
+                  <a:srgbClr val="ffffff"/>
                 </a:solidFill>
-                <a:latin typeface="한컴 말랑말랑 Bold" panose="020F0803000000000000" pitchFamily="50" charset="-127"/>
-                <a:ea typeface="한컴 말랑말랑 Bold" panose="020F0803000000000000" pitchFamily="50" charset="-127"/>
+                <a:latin typeface="한컴 말랑말랑 Bold"/>
+                <a:ea typeface="한컴 말랑말랑 Bold"/>
               </a:rPr>
             </a:br>
             <a:br>
-              <a:rPr lang="en-US" altLang="ko-KR" dirty="0">
+              <a:rPr lang="en-US" altLang="ko-KR">
                 <a:solidFill>
-                  <a:srgbClr val="FFFFFF"/>
+                  <a:srgbClr val="ffffff"/>
                 </a:solidFill>
-                <a:latin typeface="한컴 말랑말랑 Bold" panose="020F0803000000000000" pitchFamily="50" charset="-127"/>
-                <a:ea typeface="한컴 말랑말랑 Bold" panose="020F0803000000000000" pitchFamily="50" charset="-127"/>
+                <a:latin typeface="한컴 말랑말랑 Bold"/>
+                <a:ea typeface="한컴 말랑말랑 Bold"/>
               </a:rPr>
             </a:br>
             <a:r>
-              <a:rPr lang="en-US" altLang="ko-KR" dirty="0">
+              <a:rPr lang="en-US" altLang="ko-KR">
                 <a:solidFill>
-                  <a:srgbClr val="FFFFFF"/>
+                  <a:srgbClr val="ffffff"/>
                 </a:solidFill>
-                <a:latin typeface="한컴 말랑말랑 Bold" panose="020F0803000000000000" pitchFamily="50" charset="-127"/>
-                <a:ea typeface="한컴 말랑말랑 Bold" panose="020F0803000000000000" pitchFamily="50" charset="-127"/>
+                <a:latin typeface="한컴 말랑말랑 Bold"/>
+                <a:ea typeface="한컴 말랑말랑 Bold"/>
               </a:rPr>
-              <a:t>2. --------</a:t>
-            </a:r>
-            <a:endParaRPr lang="ko-KR" altLang="en-US" dirty="0">
+              <a:t>2. git push</a:t>
+            </a:r>
+            <a:endParaRPr lang="en-US" altLang="ko-KR">
               <a:solidFill>
-                <a:srgbClr val="FFFFFF"/>
+                <a:srgbClr val="ffffff"/>
               </a:solidFill>
-              <a:latin typeface="한컴 말랑말랑 Bold" panose="020F0803000000000000" pitchFamily="50" charset="-127"/>
-              <a:ea typeface="한컴 말랑말랑 Bold" panose="020F0803000000000000" pitchFamily="50" charset="-127"/>
+              <a:latin typeface="한컴 말랑말랑 Bold"/>
+              <a:ea typeface="한컴 말랑말랑 Bold"/>
             </a:endParaRPr>
           </a:p>
         </p:txBody>
       </p:sp>
       <p:sp>
         <p:nvSpPr>
-          <p:cNvPr id="3" name="부제목 2">
-            <a:extLst>
-              <a:ext uri="{FF2B5EF4-FFF2-40B4-BE49-F238E27FC236}">
-                <a16:creationId xmlns:a16="http://schemas.microsoft.com/office/drawing/2014/main" id="{D02959B3-EF0E-63AA-8139-9EAC4484DBB1}"/>
-              </a:ext>
-            </a:extLst>
-          </p:cNvPr>
+          <p:cNvPr id="3" name="부제목 2"/>
           <p:cNvSpPr>
             <a:spLocks noGrp="1"/>
           </p:cNvSpPr>
@@ -3784,65 +3769,95 @@
         <p:spPr>
           <a:xfrm>
             <a:off x="567186" y="4846083"/>
-            <a:ext cx="5024722" cy="1211818"/>
+            <a:ext cx="6231222" cy="1211818"/>
           </a:xfrm>
         </p:spPr>
         <p:txBody>
           <a:bodyPr anchor="b">
-            <a:normAutofit/>
+            <a:normAutofit lnSpcReduction="10000"/>
           </a:bodyPr>
           <a:lstStyle/>
           <a:p>
-            <a:r>
-              <a:rPr lang="ko-KR" altLang="en-US" sz="3200" dirty="0">
+            <a:pPr lvl="0">
+              <a:defRPr/>
+            </a:pPr>
+            <a:r>
+              <a:rPr lang="ko-KR" altLang="en-US" sz="3200">
                 <a:solidFill>
-                  <a:srgbClr val="FFFFFF"/>
+                  <a:srgbClr val="ffffff"/>
                 </a:solidFill>
-                <a:latin typeface="한컴 말랑말랑 Bold" panose="020F0803000000000000" pitchFamily="50" charset="-127"/>
-                <a:ea typeface="한컴 말랑말랑 Bold" panose="020F0803000000000000" pitchFamily="50" charset="-127"/>
+                <a:latin typeface="한컴 말랑말랑 Bold"/>
+                <a:ea typeface="한컴 말랑말랑 Bold"/>
               </a:rPr>
-              <a:t>학부 </a:t>
-            </a:r>
-            <a:r>
-              <a:rPr lang="en-US" altLang="ko-KR" sz="3200" dirty="0">
+              <a:t>컴퓨터과학전공 </a:t>
+            </a:r>
+            <a:r>
+              <a:rPr lang="en-US" altLang="ko-KR" sz="3200">
                 <a:solidFill>
-                  <a:srgbClr val="FFFFFF"/>
+                  <a:srgbClr val="ffffff"/>
                 </a:solidFill>
-                <a:latin typeface="한컴 말랑말랑 Bold" panose="020F0803000000000000" pitchFamily="50" charset="-127"/>
-                <a:ea typeface="한컴 말랑말랑 Bold" panose="020F0803000000000000" pitchFamily="50" charset="-127"/>
+                <a:latin typeface="한컴 말랑말랑 Bold"/>
+                <a:ea typeface="한컴 말랑말랑 Bold"/>
               </a:rPr>
-              <a:t>/ </a:t>
-            </a:r>
-            <a:r>
-              <a:rPr lang="ko-KR" altLang="en-US" sz="3200" dirty="0">
+              <a:t>/</a:t>
+            </a:r>
+            <a:r>
+              <a:rPr lang="ko-KR" altLang="en-US" sz="3200">
                 <a:solidFill>
-                  <a:srgbClr val="FFFFFF"/>
+                  <a:srgbClr val="ffffff"/>
                 </a:solidFill>
-                <a:latin typeface="한컴 말랑말랑 Bold" panose="020F0803000000000000" pitchFamily="50" charset="-127"/>
-                <a:ea typeface="한컴 말랑말랑 Bold" panose="020F0803000000000000" pitchFamily="50" charset="-127"/>
+                <a:latin typeface="한컴 말랑말랑 Bold"/>
+                <a:ea typeface="한컴 말랑말랑 Bold"/>
               </a:rPr>
-              <a:t>학번 </a:t>
-            </a:r>
-            <a:r>
-              <a:rPr lang="en-US" altLang="ko-KR" sz="3200" dirty="0">
+              <a:t> </a:t>
+            </a:r>
+            <a:r>
+              <a:rPr lang="en-US" altLang="ko-KR" sz="3200">
                 <a:solidFill>
-                  <a:srgbClr val="FFFFFF"/>
+                  <a:srgbClr val="ffffff"/>
                 </a:solidFill>
-                <a:latin typeface="한컴 말랑말랑 Bold" panose="020F0803000000000000" pitchFamily="50" charset="-127"/>
-                <a:ea typeface="한컴 말랑말랑 Bold" panose="020F0803000000000000" pitchFamily="50" charset="-127"/>
+                <a:latin typeface="한컴 말랑말랑 Bold"/>
+                <a:ea typeface="한컴 말랑말랑 Bold"/>
               </a:rPr>
-              <a:t>/ </a:t>
-            </a:r>
-            <a:r>
-              <a:rPr lang="ko-KR" altLang="en-US" sz="3200" dirty="0">
+              <a:t>2211015</a:t>
+            </a:r>
+            <a:r>
+              <a:rPr lang="ko-KR" altLang="en-US" sz="3200">
                 <a:solidFill>
-                  <a:srgbClr val="FFFFFF"/>
+                  <a:srgbClr val="ffffff"/>
                 </a:solidFill>
-                <a:latin typeface="한컴 말랑말랑 Bold" panose="020F0803000000000000" pitchFamily="50" charset="-127"/>
-                <a:ea typeface="한컴 말랑말랑 Bold" panose="020F0803000000000000" pitchFamily="50" charset="-127"/>
+                <a:latin typeface="한컴 말랑말랑 Bold"/>
+                <a:ea typeface="한컴 말랑말랑 Bold"/>
               </a:rPr>
-              <a:t>이름</a:t>
-            </a:r>
+              <a:t> </a:t>
+            </a:r>
+            <a:r>
+              <a:rPr lang="en-US" altLang="ko-KR" sz="3200">
+                <a:solidFill>
+                  <a:srgbClr val="ffffff"/>
+                </a:solidFill>
+                <a:latin typeface="한컴 말랑말랑 Bold"/>
+                <a:ea typeface="한컴 말랑말랑 Bold"/>
+              </a:rPr>
+              <a:t>/</a:t>
+            </a:r>
+            <a:r>
+              <a:rPr lang="ko-KR" altLang="en-US" sz="3200">
+                <a:solidFill>
+                  <a:srgbClr val="ffffff"/>
+                </a:solidFill>
+                <a:latin typeface="한컴 말랑말랑 Bold"/>
+                <a:ea typeface="한컴 말랑말랑 Bold"/>
+              </a:rPr>
+              <a:t> 홍서현</a:t>
+            </a:r>
+            <a:endParaRPr lang="ko-KR" altLang="en-US" sz="3200">
+              <a:solidFill>
+                <a:srgbClr val="ffffff"/>
+              </a:solidFill>
+              <a:latin typeface="한컴 말랑말랑 Bold"/>
+              <a:ea typeface="한컴 말랑말랑 Bold"/>
+            </a:endParaRPr>
           </a:p>
         </p:txBody>
       </p:sp>
@@ -3964,44 +3979,44 @@
 </file>
 
 <file path=ppt/theme/theme1.xml><?xml version="1.0" encoding="utf-8"?>
-<a:theme xmlns:a="http://schemas.openxmlformats.org/drawingml/2006/main" name="TribuneVTI">
+<a:theme xmlns:r="http://schemas.openxmlformats.org/officeDocument/2006/relationships" xmlns:c="http://schemas.openxmlformats.org/drawingml/2006/chart" xmlns:dgm="http://schemas.openxmlformats.org/drawingml/2006/diagram" xmlns:dsp="http://schemas.microsoft.com/office/drawing/2008/diagram" xmlns:a="http://schemas.openxmlformats.org/drawingml/2006/main" xmlns:pic="http://schemas.openxmlformats.org/drawingml/2006/picture" xmlns:wp="http://schemas.openxmlformats.org/drawingml/2006/wordprocessingDrawing" xmlns:xdr="http://schemas.openxmlformats.org/drawingml/2006/spreadsheetDrawing" xmlns:lc="http://schemas.openxmlformats.org/drawingml/2006/lockedCanvas" xmlns:p="http://schemas.openxmlformats.org/presentationml/2006/main" name="TribuneVTI">
   <a:themeElements>
     <a:clrScheme name="AnalogousFromLightSeedLeftStep">
       <a:dk1>
         <a:srgbClr val="000000"/>
       </a:dk1>
       <a:lt1>
-        <a:srgbClr val="FFFFFF"/>
+        <a:srgbClr val="ffffff"/>
       </a:lt1>
       <a:dk2>
-        <a:srgbClr val="3C2441"/>
+        <a:srgbClr val="3c2441"/>
       </a:dk2>
       <a:lt2>
-        <a:srgbClr val="E2E5E8"/>
+        <a:srgbClr val="e2e5e8"/>
       </a:lt2>
       <a:accent1>
-        <a:srgbClr val="C49B6D"/>
+        <a:srgbClr val="c49b6d"/>
       </a:accent1>
       <a:accent2>
-        <a:srgbClr val="C67B72"/>
+        <a:srgbClr val="c67b72"/>
       </a:accent2>
       <a:accent3>
-        <a:srgbClr val="D18CA1"/>
+        <a:srgbClr val="d18ca1"/>
       </a:accent3>
       <a:accent4>
-        <a:srgbClr val="C672B0"/>
+        <a:srgbClr val="c672b0"/>
       </a:accent4>
       <a:accent5>
-        <a:srgbClr val="C78CD1"/>
+        <a:srgbClr val="c78cd1"/>
       </a:accent5>
       <a:accent6>
-        <a:srgbClr val="9772C6"/>
+        <a:srgbClr val="9772c6"/>
       </a:accent6>
       <a:hlink>
-        <a:srgbClr val="6184AA"/>
+        <a:srgbClr val="6184aa"/>
       </a:hlink>
       <a:folHlink>
-        <a:srgbClr val="7F7F7F"/>
+        <a:srgbClr val="7f7f7f"/>
       </a:folHlink>
     </a:clrScheme>
     <a:fontScheme name="Amasis-Univers">
@@ -4080,21 +4095,21 @@
             <a:schemeClr val="phClr"/>
           </a:solidFill>
           <a:prstDash val="solid"/>
-          <a:miter lim="800000"/>
+          <a:miter/>
         </a:ln>
         <a:ln w="12700" cap="flat" cmpd="sng" algn="ctr">
           <a:solidFill>
             <a:schemeClr val="phClr"/>
           </a:solidFill>
           <a:prstDash val="solid"/>
-          <a:miter lim="800000"/>
+          <a:miter/>
         </a:ln>
         <a:ln w="19050" cap="flat" cmpd="sng" algn="ctr">
           <a:solidFill>
             <a:schemeClr val="phClr"/>
           </a:solidFill>
           <a:prstDash val="solid"/>
-          <a:miter lim="800000"/>
+          <a:miter/>
         </a:ln>
       </a:lnStyleLst>
       <a:effectStyleLst>
@@ -4154,207 +4169,5 @@
       </a:bgFillStyleLst>
     </a:fmtScheme>
   </a:themeElements>
-  <a:objectDefaults/>
-  <a:extraClrSchemeLst/>
-  <a:extLst>
-    <a:ext uri="{05A4C25C-085E-4340-85A3-A5531E510DB2}">
-      <thm15:themeFamily xmlns:thm15="http://schemas.microsoft.com/office/thememl/2012/main" name="TribuneVTI" id="{4D84C650-59FC-4F6B-ADA6-B11C508FF6CE}" vid="{0E07EAE6-ACBC-4250-8522-FC108A45043A}"/>
-    </a:ext>
-  </a:extLst>
 </a:theme>
-</file>
-
-<file path=customXml/item1.xml><?xml version="1.0" encoding="utf-8"?>
-<p:properties xmlns:p="http://schemas.microsoft.com/office/2006/metadata/properties" xmlns:xsi="http://www.w3.org/2001/XMLSchema-instance" xmlns:pc="http://schemas.microsoft.com/office/infopath/2007/PartnerControls">
-  <documentManagement/>
-</p:properties>
-</file>
-
-<file path=customXml/item2.xml><?xml version="1.0" encoding="utf-8"?>
-<?mso-contentType ?>
-<FormTemplates xmlns="http://schemas.microsoft.com/sharepoint/v3/contenttype/forms">
-  <Display>DocumentLibraryForm</Display>
-  <Edit>DocumentLibraryForm</Edit>
-  <New>DocumentLibraryForm</New>
-</FormTemplates>
-</file>
-
-<file path=customXml/item3.xml><?xml version="1.0" encoding="utf-8"?>
-<ct:contentTypeSchema xmlns:ct="http://schemas.microsoft.com/office/2006/metadata/contentType" xmlns:ma="http://schemas.microsoft.com/office/2006/metadata/properties/metaAttributes" ct:_="" ma:_="" ma:contentTypeName="문서" ma:contentTypeID="0x0101001D100452559EB044BE388605CB74258D" ma:contentTypeVersion="3" ma:contentTypeDescription="새 문서를 만듭니다." ma:contentTypeScope="" ma:versionID="cece4e6235a4db8d39d8d638fea72851">
-  <xsd:schema xmlns:xsd="http://www.w3.org/2001/XMLSchema" xmlns:xs="http://www.w3.org/2001/XMLSchema" xmlns:p="http://schemas.microsoft.com/office/2006/metadata/properties" xmlns:ns3="98b0916f-e4a7-4c55-83b1-875d2b78f67f" targetNamespace="http://schemas.microsoft.com/office/2006/metadata/properties" ma:root="true" ma:fieldsID="6378c330591d7126ae0349359d00147e" ns3:_="">
-    <xsd:import namespace="98b0916f-e4a7-4c55-83b1-875d2b78f67f"/>
-    <xsd:element name="properties">
-      <xsd:complexType>
-        <xsd:sequence>
-          <xsd:element name="documentManagement">
-            <xsd:complexType>
-              <xsd:all>
-                <xsd:element ref="ns3:MediaServiceMetadata" minOccurs="0"/>
-                <xsd:element ref="ns3:MediaServiceFastMetadata" minOccurs="0"/>
-                <xsd:element ref="ns3:MediaServiceObjectDetectorVersions" minOccurs="0"/>
-              </xsd:all>
-            </xsd:complexType>
-          </xsd:element>
-        </xsd:sequence>
-      </xsd:complexType>
-    </xsd:element>
-  </xsd:schema>
-  <xsd:schema xmlns:xsd="http://www.w3.org/2001/XMLSchema" xmlns:xs="http://www.w3.org/2001/XMLSchema" xmlns:dms="http://schemas.microsoft.com/office/2006/documentManagement/types" xmlns:pc="http://schemas.microsoft.com/office/infopath/2007/PartnerControls" targetNamespace="98b0916f-e4a7-4c55-83b1-875d2b78f67f" elementFormDefault="qualified">
-    <xsd:import namespace="http://schemas.microsoft.com/office/2006/documentManagement/types"/>
-    <xsd:import namespace="http://schemas.microsoft.com/office/infopath/2007/PartnerControls"/>
-    <xsd:element name="MediaServiceMetadata" ma:index="8" nillable="true" ma:displayName="MediaServiceMetadata" ma:hidden="true" ma:internalName="MediaServiceMetadata" ma:readOnly="true">
-      <xsd:simpleType>
-        <xsd:restriction base="dms:Note"/>
-      </xsd:simpleType>
-    </xsd:element>
-    <xsd:element name="MediaServiceFastMetadata" ma:index="9" nillable="true" ma:displayName="MediaServiceFastMetadata" ma:hidden="true" ma:internalName="MediaServiceFastMetadata" ma:readOnly="true">
-      <xsd:simpleType>
-        <xsd:restriction base="dms:Note"/>
-      </xsd:simpleType>
-    </xsd:element>
-    <xsd:element name="MediaServiceObjectDetectorVersions" ma:index="10" nillable="true" ma:displayName="MediaServiceObjectDetectorVersions" ma:hidden="true" ma:indexed="true" ma:internalName="MediaServiceObjectDetectorVersions" ma:readOnly="true">
-      <xsd:simpleType>
-        <xsd:restriction base="dms:Text"/>
-      </xsd:simpleType>
-    </xsd:element>
-  </xsd:schema>
-  <xsd:schema xmlns="http://schemas.openxmlformats.org/package/2006/metadata/core-properties" xmlns:xsd="http://www.w3.org/2001/XMLSchema" xmlns:xsi="http://www.w3.org/2001/XMLSchema-instance" xmlns:dc="http://purl.org/dc/elements/1.1/" xmlns:dcterms="http://purl.org/dc/terms/" xmlns:odoc="http://schemas.microsoft.com/internal/obd" targetNamespace="http://schemas.openxmlformats.org/package/2006/metadata/core-properties" elementFormDefault="qualified" attributeFormDefault="unqualified" blockDefault="#all">
-    <xsd:import namespace="http://purl.org/dc/elements/1.1/" schemaLocation="http://dublincore.org/schemas/xmls/qdc/2003/04/02/dc.xsd"/>
-    <xsd:import namespace="http://purl.org/dc/terms/" schemaLocation="http://dublincore.org/schemas/xmls/qdc/2003/04/02/dcterms.xsd"/>
-    <xsd:element name="coreProperties" type="CT_coreProperties"/>
-    <xsd:complexType name="CT_coreProperties">
-      <xsd:all>
-        <xsd:element ref="dc:creator" minOccurs="0" maxOccurs="1"/>
-        <xsd:element ref="dcterms:created" minOccurs="0" maxOccurs="1"/>
-        <xsd:element ref="dc:identifier" minOccurs="0" maxOccurs="1"/>
-        <xsd:element name="contentType" minOccurs="0" maxOccurs="1" type="xsd:string" ma:index="0" ma:displayName="콘텐츠 형식"/>
-        <xsd:element ref="dc:title" minOccurs="0" maxOccurs="1" ma:index="4" ma:displayName="제목"/>
-        <xsd:element ref="dc:subject" minOccurs="0" maxOccurs="1"/>
-        <xsd:element ref="dc:description" minOccurs="0" maxOccurs="1"/>
-        <xsd:element name="keywords" minOccurs="0" maxOccurs="1" type="xsd:string"/>
-        <xsd:element ref="dc:language" minOccurs="0" maxOccurs="1"/>
-        <xsd:element name="category" minOccurs="0" maxOccurs="1" type="xsd:string"/>
-        <xsd:element name="version" minOccurs="0" maxOccurs="1" type="xsd:string"/>
-        <xsd:element name="revision" minOccurs="0" maxOccurs="1" type="xsd:string">
-          <xsd:annotation>
-            <xsd:documentation>
-                        This value indicates the number of saves or revisions. The application is responsible for updating this value after each revision.
-                    </xsd:documentation>
-          </xsd:annotation>
-        </xsd:element>
-        <xsd:element name="lastModifiedBy" minOccurs="0" maxOccurs="1" type="xsd:string"/>
-        <xsd:element ref="dcterms:modified" minOccurs="0" maxOccurs="1"/>
-        <xsd:element name="contentStatus" minOccurs="0" maxOccurs="1" type="xsd:string"/>
-      </xsd:all>
-    </xsd:complexType>
-  </xsd:schema>
-  <xs:schema xmlns:pc="http://schemas.microsoft.com/office/infopath/2007/PartnerControls" xmlns:xs="http://www.w3.org/2001/XMLSchema" targetNamespace="http://schemas.microsoft.com/office/infopath/2007/PartnerControls" elementFormDefault="qualified" attributeFormDefault="unqualified">
-    <xs:element name="Person">
-      <xs:complexType>
-        <xs:sequence>
-          <xs:element ref="pc:DisplayName" minOccurs="0"/>
-          <xs:element ref="pc:AccountId" minOccurs="0"/>
-          <xs:element ref="pc:AccountType" minOccurs="0"/>
-        </xs:sequence>
-      </xs:complexType>
-    </xs:element>
-    <xs:element name="DisplayName" type="xs:string"/>
-    <xs:element name="AccountId" type="xs:string"/>
-    <xs:element name="AccountType" type="xs:string"/>
-    <xs:element name="BDCAssociatedEntity">
-      <xs:complexType>
-        <xs:sequence>
-          <xs:element ref="pc:BDCEntity" minOccurs="0" maxOccurs="unbounded"/>
-        </xs:sequence>
-        <xs:attribute ref="pc:EntityNamespace"/>
-        <xs:attribute ref="pc:EntityName"/>
-        <xs:attribute ref="pc:SystemInstanceName"/>
-        <xs:attribute ref="pc:AssociationName"/>
-      </xs:complexType>
-    </xs:element>
-    <xs:attribute name="EntityNamespace" type="xs:string"/>
-    <xs:attribute name="EntityName" type="xs:string"/>
-    <xs:attribute name="SystemInstanceName" type="xs:string"/>
-    <xs:attribute name="AssociationName" type="xs:string"/>
-    <xs:element name="BDCEntity">
-      <xs:complexType>
-        <xs:sequence>
-          <xs:element ref="pc:EntityDisplayName" minOccurs="0"/>
-          <xs:element ref="pc:EntityInstanceReference" minOccurs="0"/>
-          <xs:element ref="pc:EntityId1" minOccurs="0"/>
-          <xs:element ref="pc:EntityId2" minOccurs="0"/>
-          <xs:element ref="pc:EntityId3" minOccurs="0"/>
-          <xs:element ref="pc:EntityId4" minOccurs="0"/>
-          <xs:element ref="pc:EntityId5" minOccurs="0"/>
-        </xs:sequence>
-      </xs:complexType>
-    </xs:element>
-    <xs:element name="EntityDisplayName" type="xs:string"/>
-    <xs:element name="EntityInstanceReference" type="xs:string"/>
-    <xs:element name="EntityId1" type="xs:string"/>
-    <xs:element name="EntityId2" type="xs:string"/>
-    <xs:element name="EntityId3" type="xs:string"/>
-    <xs:element name="EntityId4" type="xs:string"/>
-    <xs:element name="EntityId5" type="xs:string"/>
-    <xs:element name="Terms">
-      <xs:complexType>
-        <xs:sequence>
-          <xs:element ref="pc:TermInfo" minOccurs="0" maxOccurs="unbounded"/>
-        </xs:sequence>
-      </xs:complexType>
-    </xs:element>
-    <xs:element name="TermInfo">
-      <xs:complexType>
-        <xs:sequence>
-          <xs:element ref="pc:TermName" minOccurs="0"/>
-          <xs:element ref="pc:TermId" minOccurs="0"/>
-        </xs:sequence>
-      </xs:complexType>
-    </xs:element>
-    <xs:element name="TermName" type="xs:string"/>
-    <xs:element name="TermId" type="xs:string"/>
-  </xs:schema>
-</ct:contentTypeSchema>
-</file>
-
-<file path=customXml/itemProps1.xml><?xml version="1.0" encoding="utf-8"?>
-<ds:datastoreItem xmlns:ds="http://schemas.openxmlformats.org/officeDocument/2006/customXml" ds:itemID="{04E61994-E40D-4A68-9927-853208928391}">
-  <ds:schemaRefs>
-    <ds:schemaRef ds:uri="http://purl.org/dc/dcmitype/"/>
-    <ds:schemaRef ds:uri="http://schemas.microsoft.com/office/2006/documentManagement/types"/>
-    <ds:schemaRef ds:uri="http://www.w3.org/XML/1998/namespace"/>
-    <ds:schemaRef ds:uri="http://purl.org/dc/terms/"/>
-    <ds:schemaRef ds:uri="http://schemas.microsoft.com/office/2006/metadata/properties"/>
-    <ds:schemaRef ds:uri="98b0916f-e4a7-4c55-83b1-875d2b78f67f"/>
-    <ds:schemaRef ds:uri="http://schemas.microsoft.com/office/infopath/2007/PartnerControls"/>
-    <ds:schemaRef ds:uri="http://schemas.openxmlformats.org/package/2006/metadata/core-properties"/>
-    <ds:schemaRef ds:uri="http://purl.org/dc/elements/1.1/"/>
-  </ds:schemaRefs>
-</ds:datastoreItem>
-</file>
-
-<file path=customXml/itemProps2.xml><?xml version="1.0" encoding="utf-8"?>
-<ds:datastoreItem xmlns:ds="http://schemas.openxmlformats.org/officeDocument/2006/customXml" ds:itemID="{B83A4207-492F-492F-AC12-D6CB0949B3B3}">
-  <ds:schemaRefs>
-    <ds:schemaRef ds:uri="http://schemas.microsoft.com/sharepoint/v3/contenttype/forms"/>
-  </ds:schemaRefs>
-</ds:datastoreItem>
-</file>
-
-<file path=customXml/itemProps3.xml><?xml version="1.0" encoding="utf-8"?>
-<ds:datastoreItem xmlns:ds="http://schemas.openxmlformats.org/officeDocument/2006/customXml" ds:itemID="{9B55A3BC-FD9C-4E32-B806-11857434362A}">
-  <ds:schemaRefs>
-    <ds:schemaRef ds:uri="http://schemas.microsoft.com/office/2006/metadata/contentType"/>
-    <ds:schemaRef ds:uri="http://schemas.microsoft.com/office/2006/metadata/properties/metaAttributes"/>
-    <ds:schemaRef ds:uri="http://www.w3.org/2001/XMLSchema"/>
-    <ds:schemaRef ds:uri="http://schemas.microsoft.com/office/2006/metadata/properties"/>
-    <ds:schemaRef ds:uri="98b0916f-e4a7-4c55-83b1-875d2b78f67f"/>
-    <ds:schemaRef ds:uri="http://schemas.microsoft.com/office/2006/documentManagement/types"/>
-    <ds:schemaRef ds:uri="http://schemas.microsoft.com/office/infopath/2007/PartnerControls"/>
-    <ds:schemaRef ds:uri="http://schemas.openxmlformats.org/package/2006/metadata/core-properties"/>
-    <ds:schemaRef ds:uri="http://purl.org/dc/elements/1.1/"/>
-    <ds:schemaRef ds:uri="http://purl.org/dc/terms/"/>
-    <ds:schemaRef ds:uri="http://schemas.microsoft.com/internal/obd"/>
-  </ds:schemaRefs>
-</ds:datastoreItem>
 </file>
</xml_diff>